<commit_message>
PPT for this project ver 1.0.0
</commit_message>
<xml_diff>
--- a/Project_SmartPhone_for_Summit/PPT/PROJECT SMART PHONE.pptx
+++ b/Project_SmartPhone_for_Summit/PPT/PROJECT SMART PHONE.pptx
@@ -219,7 +219,7 @@
             <a:fld id="{70CF6950-D2DB-42C9-8BE8-1173AE66F473}" type="datetimeFigureOut">
               <a:rPr lang="ko-KR" altLang="en-US" smtClean="0"/>
               <a:pPr/>
-              <a:t>2019-02-22</a:t>
+              <a:t>2019-02-27</a:t>
             </a:fld>
             <a:endParaRPr lang="ko-KR" altLang="en-US"/>
           </a:p>
@@ -1201,7 +1201,7 @@
             <a:fld id="{544213AF-26F6-41FA-8D85-E2C5388D6E58}" type="datetimeFigureOut">
               <a:rPr lang="en-US" smtClean="0"/>
               <a:pPr/>
-              <a:t>2/22/2019</a:t>
+              <a:t>2/27/2019</a:t>
             </a:fld>
             <a:endParaRPr lang="en-US" dirty="0">
               <a:solidFill>
@@ -1413,7 +1413,7 @@
             <a:fld id="{544213AF-26F6-41FA-8D85-E2C5388D6E58}" type="datetimeFigureOut">
               <a:rPr lang="en-US" smtClean="0"/>
               <a:pPr/>
-              <a:t>2/22/2019</a:t>
+              <a:t>2/27/2019</a:t>
             </a:fld>
             <a:endParaRPr lang="en-US"/>
           </a:p>
@@ -1600,7 +1600,7 @@
             <a:fld id="{544213AF-26F6-41FA-8D85-E2C5388D6E58}" type="datetimeFigureOut">
               <a:rPr lang="en-US" smtClean="0"/>
               <a:pPr/>
-              <a:t>2/22/2019</a:t>
+              <a:t>2/27/2019</a:t>
             </a:fld>
             <a:endParaRPr lang="en-US"/>
           </a:p>
@@ -1752,7 +1752,7 @@
             <a:fld id="{544213AF-26F6-41FA-8D85-E2C5388D6E58}" type="datetimeFigureOut">
               <a:rPr lang="en-US" smtClean="0"/>
               <a:pPr/>
-              <a:t>2/22/2019</a:t>
+              <a:t>2/27/2019</a:t>
             </a:fld>
             <a:endParaRPr lang="en-US"/>
           </a:p>
@@ -2009,7 +2009,7 @@
             <a:fld id="{544213AF-26F6-41FA-8D85-E2C5388D6E58}" type="datetimeFigureOut">
               <a:rPr lang="en-US" smtClean="0"/>
               <a:pPr/>
-              <a:t>2/22/2019</a:t>
+              <a:t>2/27/2019</a:t>
             </a:fld>
             <a:endParaRPr lang="en-US"/>
           </a:p>
@@ -2420,7 +2420,7 @@
             <a:fld id="{544213AF-26F6-41FA-8D85-E2C5388D6E58}" type="datetimeFigureOut">
               <a:rPr lang="en-US" smtClean="0"/>
               <a:pPr/>
-              <a:t>2/22/2019</a:t>
+              <a:t>2/27/2019</a:t>
             </a:fld>
             <a:endParaRPr lang="en-US"/>
           </a:p>
@@ -2868,7 +2868,7 @@
             <a:fld id="{544213AF-26F6-41FA-8D85-E2C5388D6E58}" type="datetimeFigureOut">
               <a:rPr lang="en-US" smtClean="0"/>
               <a:pPr/>
-              <a:t>2/22/2019</a:t>
+              <a:t>2/27/2019</a:t>
             </a:fld>
             <a:endParaRPr lang="en-US"/>
           </a:p>
@@ -2971,7 +2971,7 @@
             <a:fld id="{544213AF-26F6-41FA-8D85-E2C5388D6E58}" type="datetimeFigureOut">
               <a:rPr lang="en-US" smtClean="0"/>
               <a:pPr/>
-              <a:t>2/22/2019</a:t>
+              <a:t>2/27/2019</a:t>
             </a:fld>
             <a:endParaRPr lang="en-US"/>
           </a:p>
@@ -3094,7 +3094,7 @@
             <a:fld id="{544213AF-26F6-41FA-8D85-E2C5388D6E58}" type="datetimeFigureOut">
               <a:rPr lang="en-US" smtClean="0"/>
               <a:pPr/>
-              <a:t>2/22/2019</a:t>
+              <a:t>2/27/2019</a:t>
             </a:fld>
             <a:endParaRPr lang="en-US"/>
           </a:p>
@@ -3370,7 +3370,7 @@
             <a:fld id="{544213AF-26F6-41FA-8D85-E2C5388D6E58}" type="datetimeFigureOut">
               <a:rPr lang="en-US" smtClean="0"/>
               <a:pPr/>
-              <a:t>2/22/2019</a:t>
+              <a:t>2/27/2019</a:t>
             </a:fld>
             <a:endParaRPr lang="en-US"/>
           </a:p>
@@ -3577,7 +3577,7 @@
             <a:fld id="{544213AF-26F6-41FA-8D85-E2C5388D6E58}" type="datetimeFigureOut">
               <a:rPr lang="en-US" smtClean="0"/>
               <a:pPr/>
-              <a:t>2/22/2019</a:t>
+              <a:t>2/27/2019</a:t>
             </a:fld>
             <a:endParaRPr lang="en-US">
               <a:solidFill>
@@ -4700,7 +4700,7 @@
             <a:fld id="{544213AF-26F6-41FA-8D85-E2C5388D6E58}" type="datetimeFigureOut">
               <a:rPr lang="en-US" smtClean="0"/>
               <a:pPr/>
-              <a:t>2/22/2019</a:t>
+              <a:t>2/27/2019</a:t>
             </a:fld>
             <a:endParaRPr lang="en-US" sz="1000" dirty="0">
               <a:solidFill>
@@ -5159,8 +5159,8 @@
               <a:rPr lang="en-US" altLang="ko-KR" dirty="0" smtClean="0"/>
             </a:br>
             <a:r>
-              <a:rPr lang="ko-KR" altLang="en-US" sz="3600" dirty="0" smtClean="0"/>
-              <a:t>신혜지</a:t>
+              <a:rPr lang="ko-KR" altLang="en-US" sz="3600" smtClean="0"/>
+              <a:t>신 혜 지</a:t>
             </a:r>
             <a:r>
               <a:rPr lang="ko-KR" altLang="en-US" dirty="0" smtClean="0"/>

</xml_diff>